<commit_message>
added solder jumper layout for preSalsa board
</commit_message>
<xml_diff>
--- a/docs/hddv2.7.pptx
+++ b/docs/hddv2.7.pptx
@@ -289,7 +289,7 @@
           <a:p>
             <a:fld id="{DB40BD3D-5389-42A0-B9AC-45FA07734019}" type="datetimeFigureOut">
               <a:rPr lang="en-US" smtClean="0"/>
-              <a:t>2/9/2016</a:t>
+              <a:t>3/2/2016</a:t>
             </a:fld>
             <a:endParaRPr lang="en-US"/>
           </a:p>
@@ -459,7 +459,7 @@
           <a:p>
             <a:fld id="{DB40BD3D-5389-42A0-B9AC-45FA07734019}" type="datetimeFigureOut">
               <a:rPr lang="en-US" smtClean="0"/>
-              <a:t>2/9/2016</a:t>
+              <a:t>3/2/2016</a:t>
             </a:fld>
             <a:endParaRPr lang="en-US"/>
           </a:p>
@@ -639,7 +639,7 @@
           <a:p>
             <a:fld id="{DB40BD3D-5389-42A0-B9AC-45FA07734019}" type="datetimeFigureOut">
               <a:rPr lang="en-US" smtClean="0"/>
-              <a:t>2/9/2016</a:t>
+              <a:t>3/2/2016</a:t>
             </a:fld>
             <a:endParaRPr lang="en-US"/>
           </a:p>
@@ -809,7 +809,7 @@
           <a:p>
             <a:fld id="{DB40BD3D-5389-42A0-B9AC-45FA07734019}" type="datetimeFigureOut">
               <a:rPr lang="en-US" smtClean="0"/>
-              <a:t>2/9/2016</a:t>
+              <a:t>3/2/2016</a:t>
             </a:fld>
             <a:endParaRPr lang="en-US"/>
           </a:p>
@@ -1055,7 +1055,7 @@
           <a:p>
             <a:fld id="{DB40BD3D-5389-42A0-B9AC-45FA07734019}" type="datetimeFigureOut">
               <a:rPr lang="en-US" smtClean="0"/>
-              <a:t>2/9/2016</a:t>
+              <a:t>3/2/2016</a:t>
             </a:fld>
             <a:endParaRPr lang="en-US"/>
           </a:p>
@@ -1343,7 +1343,7 @@
           <a:p>
             <a:fld id="{DB40BD3D-5389-42A0-B9AC-45FA07734019}" type="datetimeFigureOut">
               <a:rPr lang="en-US" smtClean="0"/>
-              <a:t>2/9/2016</a:t>
+              <a:t>3/2/2016</a:t>
             </a:fld>
             <a:endParaRPr lang="en-US"/>
           </a:p>
@@ -1765,7 +1765,7 @@
           <a:p>
             <a:fld id="{DB40BD3D-5389-42A0-B9AC-45FA07734019}" type="datetimeFigureOut">
               <a:rPr lang="en-US" smtClean="0"/>
-              <a:t>2/9/2016</a:t>
+              <a:t>3/2/2016</a:t>
             </a:fld>
             <a:endParaRPr lang="en-US"/>
           </a:p>
@@ -1883,7 +1883,7 @@
           <a:p>
             <a:fld id="{DB40BD3D-5389-42A0-B9AC-45FA07734019}" type="datetimeFigureOut">
               <a:rPr lang="en-US" smtClean="0"/>
-              <a:t>2/9/2016</a:t>
+              <a:t>3/2/2016</a:t>
             </a:fld>
             <a:endParaRPr lang="en-US"/>
           </a:p>
@@ -1978,7 +1978,7 @@
           <a:p>
             <a:fld id="{DB40BD3D-5389-42A0-B9AC-45FA07734019}" type="datetimeFigureOut">
               <a:rPr lang="en-US" smtClean="0"/>
-              <a:t>2/9/2016</a:t>
+              <a:t>3/2/2016</a:t>
             </a:fld>
             <a:endParaRPr lang="en-US"/>
           </a:p>
@@ -2255,7 +2255,7 @@
           <a:p>
             <a:fld id="{DB40BD3D-5389-42A0-B9AC-45FA07734019}" type="datetimeFigureOut">
               <a:rPr lang="en-US" smtClean="0"/>
-              <a:t>2/9/2016</a:t>
+              <a:t>3/2/2016</a:t>
             </a:fld>
             <a:endParaRPr lang="en-US"/>
           </a:p>
@@ -2508,7 +2508,7 @@
           <a:p>
             <a:fld id="{DB40BD3D-5389-42A0-B9AC-45FA07734019}" type="datetimeFigureOut">
               <a:rPr lang="en-US" smtClean="0"/>
-              <a:t>2/9/2016</a:t>
+              <a:t>3/2/2016</a:t>
             </a:fld>
             <a:endParaRPr lang="en-US"/>
           </a:p>
@@ -2721,7 +2721,7 @@
           <a:p>
             <a:fld id="{DB40BD3D-5389-42A0-B9AC-45FA07734019}" type="datetimeFigureOut">
               <a:rPr lang="en-US" smtClean="0"/>
-              <a:t>2/9/2016</a:t>
+              <a:t>3/2/2016</a:t>
             </a:fld>
             <a:endParaRPr lang="en-US"/>
           </a:p>
@@ -3173,11 +3173,7 @@
             <a:pPr algn="l"/>
             <a:r>
               <a:rPr lang="en-US" sz="3600" dirty="0" smtClean="0"/>
-              <a:t>Pin </a:t>
-            </a:r>
-            <a:r>
-              <a:rPr lang="en-US" sz="3600" dirty="0" smtClean="0"/>
-              <a:t>OUT v2.7</a:t>
+              <a:t>Pin OUT v2.7</a:t>
             </a:r>
             <a:r>
               <a:rPr lang="en-US" dirty="0" smtClean="0"/>
@@ -3194,17 +3190,7 @@
                   </a:schemeClr>
                 </a:solidFill>
               </a:rPr>
-              <a:t>Salsa </a:t>
-            </a:r>
-            <a:r>
-              <a:rPr lang="en-US" sz="2200" dirty="0" smtClean="0">
-                <a:solidFill>
-                  <a:schemeClr val="bg1">
-                    <a:lumMod val="50000"/>
-                  </a:schemeClr>
-                </a:solidFill>
-              </a:rPr>
-              <a:t>DIP</a:t>
+              <a:t>Salsa DIP</a:t>
             </a:r>
             <a:endParaRPr lang="en-US" sz="4000" dirty="0">
               <a:solidFill>
@@ -3448,8 +3434,11 @@
                   </a:schemeClr>
                 </a:solidFill>
               </a:rPr>
-              <a:t>Low side PWM, 6A, </a:t>
-            </a:r>
+              <a:t>Low side PWM, 6A, 30V</a:t>
+            </a:r>
+          </a:p>
+          <a:p>
+            <a:pPr algn="l"/>
             <a:r>
               <a:rPr lang="en-US" sz="1800" dirty="0" smtClean="0">
                 <a:solidFill>
@@ -3459,30 +3448,8 @@
                   </a:schemeClr>
                 </a:solidFill>
               </a:rPr>
-              <a:t>30V</a:t>
-            </a:r>
-          </a:p>
-          <a:p>
-            <a:pPr algn="l"/>
-            <a:r>
-              <a:rPr lang="en-US" sz="1800" dirty="0" smtClean="0">
-                <a:solidFill>
-                  <a:schemeClr val="tx1">
-                    <a:lumMod val="65000"/>
-                    <a:lumOff val="35000"/>
-                  </a:schemeClr>
-                </a:solidFill>
-              </a:rPr>
               <a:t>Or Motor Driver, 600mA</a:t>
             </a:r>
-            <a:endParaRPr lang="en-US" sz="1800" dirty="0" smtClean="0">
-              <a:solidFill>
-                <a:schemeClr val="tx1">
-                  <a:lumMod val="65000"/>
-                  <a:lumOff val="35000"/>
-                </a:schemeClr>
-              </a:solidFill>
-            </a:endParaRPr>
           </a:p>
           <a:p>
             <a:pPr algn="l"/>
@@ -5880,18 +5847,7 @@
                   </a:schemeClr>
                 </a:solidFill>
               </a:rPr>
-              <a:t>UART </a:t>
-            </a:r>
-            <a:r>
-              <a:rPr lang="en-US" sz="1800" b="1" dirty="0" smtClean="0">
-                <a:solidFill>
-                  <a:schemeClr val="tx1">
-                    <a:lumMod val="65000"/>
-                    <a:lumOff val="35000"/>
-                  </a:schemeClr>
-                </a:solidFill>
-              </a:rPr>
-              <a:t>header</a:t>
+              <a:t>UART header</a:t>
             </a:r>
           </a:p>
           <a:p>
@@ -10301,11 +10257,7 @@
             <a:pPr algn="l"/>
             <a:r>
               <a:rPr lang="en-US" sz="4000" dirty="0" smtClean="0"/>
-              <a:t>Jumper </a:t>
-            </a:r>
-            <a:r>
-              <a:rPr lang="en-US" sz="4000" dirty="0" smtClean="0"/>
-              <a:t>Config v2.5!</a:t>
+              <a:t>Jumper Config v2.5!</a:t>
             </a:r>
             <a:r>
               <a:rPr lang="en-US" dirty="0" smtClean="0"/>
@@ -12780,7 +12732,7 @@
           <p:nvPr>
             <p:extLst>
               <p:ext uri="{D42A27DB-BD31-4B8C-83A1-F6EECF244321}">
-                <p14:modId xmlns:p14="http://schemas.microsoft.com/office/powerpoint/2010/main" val="2449977255"/>
+                <p14:modId xmlns:p14="http://schemas.microsoft.com/office/powerpoint/2010/main" val="3345881890"/>
               </p:ext>
             </p:extLst>
           </p:nvPr>
@@ -12905,7 +12857,23 @@
                       </a:r>
                       <a:r>
                         <a:rPr lang="en-US" sz="1000" baseline="0" dirty="0" smtClean="0"/>
-                        <a:t> Vin is not 5V close it, to get CHIP 5V on the output</a:t>
+                        <a:t> Vin is </a:t>
+                      </a:r>
+                      <a:r>
+                        <a:rPr lang="en-US" sz="1000" b="1" baseline="0" dirty="0" smtClean="0"/>
+                        <a:t>not</a:t>
+                      </a:r>
+                      <a:r>
+                        <a:rPr lang="en-US" sz="1000" baseline="0" dirty="0" smtClean="0"/>
+                        <a:t> 5V close it, to get </a:t>
+                      </a:r>
+                      <a:r>
+                        <a:rPr lang="en-US" sz="1000" baseline="0" dirty="0" smtClean="0"/>
+                        <a:t>CHIPs </a:t>
+                      </a:r>
+                      <a:r>
+                        <a:rPr lang="en-US" sz="1000" baseline="0" dirty="0" smtClean="0"/>
+                        <a:t>5V on the output</a:t>
                       </a:r>
                     </a:p>
                     <a:p>
@@ -12919,7 +12887,15 @@
                       </a:r>
                       <a:r>
                         <a:rPr lang="en-US" sz="1000" baseline="0" dirty="0" smtClean="0"/>
-                        <a:t> Vin is 5V and you close SJ5, close this one to power the DIP from the VIN, in this case you must leave SJ3 and SJ4 open!</a:t>
+                        <a:t> Vin is 5V and you close SJ5, close this one to power the DIP from the VIN, in this case you must leave SJ3 and SJ4 </a:t>
+                      </a:r>
+                      <a:r>
+                        <a:rPr lang="en-US" sz="1000" b="1" baseline="0" dirty="0" smtClean="0"/>
+                        <a:t>open</a:t>
+                      </a:r>
+                      <a:r>
+                        <a:rPr lang="en-US" sz="1000" baseline="0" dirty="0" smtClean="0"/>
+                        <a:t>!</a:t>
                       </a:r>
                       <a:endParaRPr lang="en-US" sz="1000" dirty="0"/>
                     </a:p>
@@ -12949,8 +12925,13 @@
                     <a:p>
                       <a:r>
                         <a:rPr lang="en-US" sz="1600" dirty="0" smtClean="0"/>
-                        <a:t>CHIP 5V to Vcc</a:t>
-                      </a:r>
+                        <a:t>CHIP 5V to </a:t>
+                      </a:r>
+                      <a:r>
+                        <a:rPr lang="en-US" sz="1600" dirty="0" smtClean="0"/>
+                        <a:t>Vcc (bot)</a:t>
+                      </a:r>
+                      <a:endParaRPr lang="en-US" sz="1600" dirty="0" smtClean="0"/>
                     </a:p>
                     <a:p>
                       <a:pPr marL="171450" indent="-171450">
@@ -12973,7 +12954,25 @@
                       </a:pPr>
                       <a:r>
                         <a:rPr lang="en-US" sz="1000" baseline="0" dirty="0" smtClean="0"/>
-                        <a:t>If you destroyed your CHIP onboard 5V, close it to supply power to the USB</a:t>
+                        <a:t>If </a:t>
+                      </a:r>
+                      <a:r>
+                        <a:rPr lang="en-US" sz="1000" baseline="0" dirty="0" smtClean="0"/>
+                        <a:t>you’ve </a:t>
+                      </a:r>
+                      <a:r>
+                        <a:rPr lang="en-US" sz="1000" baseline="0" dirty="0" smtClean="0"/>
+                        <a:t>destroyed your CHIP onboard 5V, close it to supply power to the </a:t>
+                      </a:r>
+                      <a:r>
+                        <a:rPr lang="en-US" sz="1000" baseline="0" dirty="0" smtClean="0"/>
+                        <a:t>USB </a:t>
+                      </a:r>
+                      <a:r>
+                        <a:rPr lang="en-US" sz="1000" baseline="0" dirty="0" smtClean="0">
+                          <a:sym typeface="Wingdings" panose="05000000000000000000" pitchFamily="2" charset="2"/>
+                        </a:rPr>
+                        <a:t></a:t>
                       </a:r>
                       <a:endParaRPr lang="en-US" sz="1000" dirty="0"/>
                     </a:p>
@@ -13003,8 +13002,13 @@
                     <a:p>
                       <a:r>
                         <a:rPr lang="en-US" sz="1600" dirty="0" smtClean="0"/>
-                        <a:t>CHIP 3.3V to Vcc</a:t>
-                      </a:r>
+                        <a:t>CHIP 3.3V to </a:t>
+                      </a:r>
+                      <a:r>
+                        <a:rPr lang="en-US" sz="1600" dirty="0" smtClean="0"/>
+                        <a:t>Vcc (bot)</a:t>
+                      </a:r>
+                      <a:endParaRPr lang="en-US" sz="1600" dirty="0" smtClean="0"/>
                     </a:p>
                     <a:p>
                       <a:pPr marL="285750" indent="-285750">
@@ -13116,27 +13120,82 @@
             </a:r>
             <a:r>
               <a:rPr lang="en-US" sz="1200" dirty="0" smtClean="0"/>
-              <a:t>: 	SJ3 and SJ4 		and</a:t>
-            </a:r>
-          </a:p>
-          <a:p>
+              <a:t>: 	SJ3 and SJ4 		</a:t>
+            </a:r>
             <a:r>
               <a:rPr lang="en-US" sz="1200" dirty="0" smtClean="0"/>
-              <a:t>SJ4, SJ2, SJ5 and supply power via Vin/Vout		and</a:t>
-            </a:r>
+              <a:t>or</a:t>
+            </a:r>
+            <a:endParaRPr lang="en-US" sz="1200" dirty="0" smtClean="0"/>
           </a:p>
           <a:p>
             <a:r>
               <a:rPr lang="en-US" sz="1200" dirty="0" smtClean="0"/>
-              <a:t>SJ3, SJ2, SJ5 and supply power via Vin/Vout		and</a:t>
-            </a:r>
-          </a:p>
-          <a:p>
+              <a:t>SJ4 + SJ2 + </a:t>
+            </a:r>
             <a:r>
               <a:rPr lang="en-US" sz="1200" dirty="0" smtClean="0"/>
-              <a:t>SJ1 if your Vin is NOT ~5V	and SJ2, SJ5 if your Vin &gt; 5V</a:t>
-            </a:r>
-            <a:endParaRPr lang="en-US" sz="1200" dirty="0"/>
+              <a:t>SJ5 and supply power via </a:t>
+            </a:r>
+            <a:r>
+              <a:rPr lang="en-US" sz="1200" dirty="0" smtClean="0"/>
+              <a:t>Vin/Vout</a:t>
+            </a:r>
+            <a:r>
+              <a:rPr lang="en-US" sz="1200" dirty="0" smtClean="0"/>
+              <a:t>	</a:t>
+            </a:r>
+            <a:r>
+              <a:rPr lang="en-US" sz="1200" dirty="0" smtClean="0"/>
+              <a:t>or</a:t>
+            </a:r>
+            <a:endParaRPr lang="en-US" sz="1200" dirty="0" smtClean="0"/>
+          </a:p>
+          <a:p>
+            <a:r>
+              <a:rPr lang="en-US" sz="1200" dirty="0" smtClean="0"/>
+              <a:t>SJ3 + SJ2 + </a:t>
+            </a:r>
+            <a:r>
+              <a:rPr lang="en-US" sz="1200" dirty="0" smtClean="0"/>
+              <a:t>SJ5 and supply power via Vin/Vout	</a:t>
+            </a:r>
+            <a:r>
+              <a:rPr lang="en-US" sz="1200" dirty="0" smtClean="0"/>
+              <a:t>or</a:t>
+            </a:r>
+            <a:endParaRPr lang="en-US" sz="1200" dirty="0" smtClean="0"/>
+          </a:p>
+          <a:p>
+            <a:r>
+              <a:rPr lang="en-US" sz="1200" dirty="0" smtClean="0"/>
+              <a:t>SJ1 if your Vin is NOT ~5V	</a:t>
+            </a:r>
+            <a:r>
+              <a:rPr lang="en-US" sz="1200" dirty="0" smtClean="0"/>
+              <a:t>or SJ2</a:t>
+            </a:r>
+            <a:r>
+              <a:rPr lang="en-US" sz="1200" dirty="0"/>
+              <a:t> </a:t>
+            </a:r>
+            <a:r>
+              <a:rPr lang="en-US" sz="1200" dirty="0" smtClean="0"/>
+              <a:t>+</a:t>
+            </a:r>
+            <a:r>
+              <a:rPr lang="en-US" sz="1200" dirty="0" smtClean="0"/>
+              <a:t> </a:t>
+            </a:r>
+            <a:r>
+              <a:rPr lang="en-US" sz="1200" dirty="0" smtClean="0"/>
+              <a:t>SJ5 if your </a:t>
+            </a:r>
+            <a:r>
+              <a:rPr lang="en-US" sz="1200" b="1" dirty="0" smtClean="0"/>
+              <a:t>Vin &gt; 5V</a:t>
+            </a:r>
+            <a:endParaRPr lang="en-US" sz="1200" b="1" dirty="0"/>
           </a:p>
         </p:txBody>
       </p:sp>
@@ -13183,14 +13242,36 @@
             </a:r>
             <a:r>
               <a:rPr lang="en-US" sz="1200" dirty="0" smtClean="0"/>
-              <a:t>: 	SJ1, SJ5, SJ2 if your Vin is 5V		or</a:t>
-            </a:r>
-          </a:p>
-          <a:p>
+              <a:t>: 	</a:t>
+            </a:r>
             <a:r>
               <a:rPr lang="en-US" sz="1200" dirty="0" smtClean="0"/>
-              <a:t>SJ2, SJ3 if you only draw a few mA</a:t>
-            </a:r>
+              <a:t>SJ1 + SJ5 + </a:t>
+            </a:r>
+            <a:r>
+              <a:rPr lang="en-US" sz="1200" dirty="0" smtClean="0"/>
+              <a:t>SJ2 if your Vin is 5V	</a:t>
+            </a:r>
+            <a:r>
+              <a:rPr lang="en-US" sz="1200" dirty="0" smtClean="0"/>
+              <a:t>or</a:t>
+            </a:r>
+            <a:endParaRPr lang="en-US" sz="1200" dirty="0" smtClean="0"/>
+          </a:p>
+          <a:p>
+            <a:r>
+              <a:rPr lang="en-US" sz="1200" smtClean="0"/>
+              <a:t>SJ2 + </a:t>
+            </a:r>
+            <a:r>
+              <a:rPr lang="en-US" sz="1200" dirty="0" smtClean="0"/>
+              <a:t>SJ3 if you only draw a few </a:t>
+            </a:r>
+            <a:r>
+              <a:rPr lang="en-US" sz="1200" dirty="0" smtClean="0"/>
+              <a:t>mA to use the CHIPs 5V</a:t>
+            </a:r>
+            <a:endParaRPr lang="en-US" sz="1200" dirty="0" smtClean="0"/>
           </a:p>
         </p:txBody>
       </p:sp>

</xml_diff>